<commit_message>
Adding 95 years logo
</commit_message>
<xml_diff>
--- a/WebContent/WEB-INF/templates/CSJ/closingPrayers.pptx
+++ b/WebContent/WEB-INF/templates/CSJ/closingPrayers.pptx
@@ -112,7 +112,7 @@
   </p:defaultTextStyle>
   <p:extLst>
     <p:ext uri="{EFAFB233-063F-42B5-8137-9DF3F51BA10A}">
-      <p15:sldGuideLst xmlns:p15="http://schemas.microsoft.com/office/powerpoint/2012/main">
+      <p15:sldGuideLst xmlns:p15="http://schemas.microsoft.com/office/powerpoint/2012/main" xmlns="">
         <p15:guide id="1" orient="horz" pos="2160" userDrawn="1">
           <p15:clr>
             <a:srgbClr val="A4A3A4"/>
@@ -211,7 +211,7 @@
           <a:p>
             <a:fld id="{B4297479-840D-294F-9C08-55F5B586E708}" type="datetimeFigureOut">
               <a:rPr lang="en-US" smtClean="0"/>
-              <a:t>1/6/19</a:t>
+              <a:t>12/01/20</a:t>
             </a:fld>
             <a:endParaRPr lang="en-US"/>
           </a:p>
@@ -746,7 +746,7 @@
           <a:p>
             <a:fld id="{30F42486-D2A3-2447-A496-D33DD53C7227}" type="datetimeFigureOut">
               <a:rPr lang="en-US" smtClean="0"/>
-              <a:t>1/6/19</a:t>
+              <a:t>12/01/20</a:t>
             </a:fld>
             <a:endParaRPr lang="en-US"/>
           </a:p>
@@ -914,7 +914,7 @@
           <a:p>
             <a:fld id="{30F42486-D2A3-2447-A496-D33DD53C7227}" type="datetimeFigureOut">
               <a:rPr lang="en-US" smtClean="0"/>
-              <a:t>1/6/19</a:t>
+              <a:t>12/01/20</a:t>
             </a:fld>
             <a:endParaRPr lang="en-US"/>
           </a:p>
@@ -1092,7 +1092,7 @@
           <a:p>
             <a:fld id="{30F42486-D2A3-2447-A496-D33DD53C7227}" type="datetimeFigureOut">
               <a:rPr lang="en-US" smtClean="0"/>
-              <a:t>1/6/19</a:t>
+              <a:t>12/01/20</a:t>
             </a:fld>
             <a:endParaRPr lang="en-US"/>
           </a:p>
@@ -1260,7 +1260,7 @@
           <a:p>
             <a:fld id="{30F42486-D2A3-2447-A496-D33DD53C7227}" type="datetimeFigureOut">
               <a:rPr lang="en-US" smtClean="0"/>
-              <a:t>1/6/19</a:t>
+              <a:t>12/01/20</a:t>
             </a:fld>
             <a:endParaRPr lang="en-US"/>
           </a:p>
@@ -1505,7 +1505,7 @@
           <a:p>
             <a:fld id="{30F42486-D2A3-2447-A496-D33DD53C7227}" type="datetimeFigureOut">
               <a:rPr lang="en-US" smtClean="0"/>
-              <a:t>1/6/19</a:t>
+              <a:t>12/01/20</a:t>
             </a:fld>
             <a:endParaRPr lang="en-US"/>
           </a:p>
@@ -1790,7 +1790,7 @@
           <a:p>
             <a:fld id="{30F42486-D2A3-2447-A496-D33DD53C7227}" type="datetimeFigureOut">
               <a:rPr lang="en-US" smtClean="0"/>
-              <a:t>1/6/19</a:t>
+              <a:t>12/01/20</a:t>
             </a:fld>
             <a:endParaRPr lang="en-US"/>
           </a:p>
@@ -2209,7 +2209,7 @@
           <a:p>
             <a:fld id="{30F42486-D2A3-2447-A496-D33DD53C7227}" type="datetimeFigureOut">
               <a:rPr lang="en-US" smtClean="0"/>
-              <a:t>1/6/19</a:t>
+              <a:t>12/01/20</a:t>
             </a:fld>
             <a:endParaRPr lang="en-US"/>
           </a:p>
@@ -2326,7 +2326,7 @@
           <a:p>
             <a:fld id="{30F42486-D2A3-2447-A496-D33DD53C7227}" type="datetimeFigureOut">
               <a:rPr lang="en-US" smtClean="0"/>
-              <a:t>1/6/19</a:t>
+              <a:t>12/01/20</a:t>
             </a:fld>
             <a:endParaRPr lang="en-US"/>
           </a:p>
@@ -2421,7 +2421,7 @@
           <a:p>
             <a:fld id="{30F42486-D2A3-2447-A496-D33DD53C7227}" type="datetimeFigureOut">
               <a:rPr lang="en-US" smtClean="0"/>
-              <a:t>1/6/19</a:t>
+              <a:t>12/01/20</a:t>
             </a:fld>
             <a:endParaRPr lang="en-US"/>
           </a:p>
@@ -2696,7 +2696,7 @@
           <a:p>
             <a:fld id="{30F42486-D2A3-2447-A496-D33DD53C7227}" type="datetimeFigureOut">
               <a:rPr lang="en-US" smtClean="0"/>
-              <a:t>1/6/19</a:t>
+              <a:t>12/01/20</a:t>
             </a:fld>
             <a:endParaRPr lang="en-US"/>
           </a:p>
@@ -2948,7 +2948,7 @@
           <a:p>
             <a:fld id="{30F42486-D2A3-2447-A496-D33DD53C7227}" type="datetimeFigureOut">
               <a:rPr lang="en-US" smtClean="0"/>
-              <a:t>1/6/19</a:t>
+              <a:t>12/01/20</a:t>
             </a:fld>
             <a:endParaRPr lang="en-US"/>
           </a:p>
@@ -3159,7 +3159,7 @@
           <a:p>
             <a:fld id="{30F42486-D2A3-2447-A496-D33DD53C7227}" type="datetimeFigureOut">
               <a:rPr lang="en-US" smtClean="0"/>
-              <a:t>1/6/19</a:t>
+              <a:t>12/01/20</a:t>
             </a:fld>
             <a:endParaRPr lang="en-US"/>
           </a:p>
@@ -3567,36 +3567,6 @@
           </a:p>
         </p:txBody>
       </p:sp>
-      <p:pic>
-        <p:nvPicPr>
-          <p:cNvPr id="9" name="Picture 8"/>
-          <p:cNvPicPr>
-            <a:picLocks noChangeAspect="1"/>
-          </p:cNvPicPr>
-          <p:nvPr/>
-        </p:nvPicPr>
-        <p:blipFill>
-          <a:blip r:embed="rId2">
-            <a:extLst>
-              <a:ext uri="{28A0092B-C50C-407E-A947-70E740481C1C}">
-                <a14:useLocalDpi xmlns:a14="http://schemas.microsoft.com/office/drawing/2010/main" val="0"/>
-              </a:ext>
-            </a:extLst>
-          </a:blip>
-          <a:stretch>
-            <a:fillRect/>
-          </a:stretch>
-        </p:blipFill>
-        <p:spPr>
-          <a:xfrm>
-            <a:off x="-1" y="-4872"/>
-            <a:ext cx="1603513" cy="1614681"/>
-          </a:xfrm>
-          <a:prstGeom prst="rect">
-            <a:avLst/>
-          </a:prstGeom>
-        </p:spPr>
-      </p:pic>
       <p:sp>
         <p:nvSpPr>
           <p:cNvPr id="23" name="AutoShape 1"/>
@@ -3605,7 +3575,7 @@
         </p:nvSpPr>
         <p:spPr>
           <a:xfrm>
-            <a:off x="28536" y="1495748"/>
+            <a:off x="28536" y="1764686"/>
             <a:ext cx="9102212" cy="3941933"/>
           </a:xfrm>
           <a:prstGeom prst="rect">
@@ -3824,8 +3794,8 @@
         </p:nvSpPr>
         <p:spPr bwMode="auto">
           <a:xfrm>
-            <a:off x="3754694" y="33134"/>
-            <a:ext cx="1676400" cy="533400"/>
+            <a:off x="3754693" y="33134"/>
+            <a:ext cx="2206835" cy="533400"/>
           </a:xfrm>
           <a:prstGeom prst="rect">
             <a:avLst/>
@@ -3848,13 +3818,18 @@
               </a:spcBef>
             </a:pPr>
             <a:r>
-              <a:rPr lang="en-US" sz="3200" b="1" i="1" dirty="0">
+              <a:rPr lang="en-US" sz="3200" b="1" i="1" dirty="0" smtClean="0">
                 <a:solidFill>
                   <a:srgbClr val="EA7600"/>
                 </a:solidFill>
               </a:rPr>
               <a:t>UNISON</a:t>
             </a:r>
+            <a:endParaRPr lang="en-US" sz="3200" b="1" i="1" dirty="0">
+              <a:solidFill>
+                <a:srgbClr val="EA7600"/>
+              </a:solidFill>
+            </a:endParaRPr>
           </a:p>
         </p:txBody>
       </p:sp>
@@ -3894,6 +3869,30 @@
           </a:p>
         </p:txBody>
       </p:sp>
+      <p:pic>
+        <p:nvPicPr>
+          <p:cNvPr id="8" name="Picture 7"/>
+          <p:cNvPicPr>
+            <a:picLocks noChangeAspect="1"/>
+          </p:cNvPicPr>
+          <p:nvPr/>
+        </p:nvPicPr>
+        <p:blipFill>
+          <a:blip r:embed="rId2"/>
+          <a:stretch>
+            <a:fillRect/>
+          </a:stretch>
+        </p:blipFill>
+        <p:spPr>
+          <a:xfrm>
+            <a:off x="-26639" y="-1"/>
+            <a:ext cx="1416299" cy="1359647"/>
+          </a:xfrm>
+          <a:prstGeom prst="rect">
+            <a:avLst/>
+          </a:prstGeom>
+        </p:spPr>
+      </p:pic>
     </p:spTree>
     <p:extLst>
       <p:ext uri="{BB962C8B-B14F-4D97-AF65-F5344CB8AC3E}">
@@ -3957,36 +3956,6 @@
           </a:p>
         </p:txBody>
       </p:sp>
-      <p:pic>
-        <p:nvPicPr>
-          <p:cNvPr id="9" name="Picture 8"/>
-          <p:cNvPicPr>
-            <a:picLocks noChangeAspect="1"/>
-          </p:cNvPicPr>
-          <p:nvPr/>
-        </p:nvPicPr>
-        <p:blipFill>
-          <a:blip r:embed="rId2">
-            <a:extLst>
-              <a:ext uri="{28A0092B-C50C-407E-A947-70E740481C1C}">
-                <a14:useLocalDpi xmlns:a14="http://schemas.microsoft.com/office/drawing/2010/main" val="0"/>
-              </a:ext>
-            </a:extLst>
-          </a:blip>
-          <a:stretch>
-            <a:fillRect/>
-          </a:stretch>
-        </p:blipFill>
-        <p:spPr>
-          <a:xfrm>
-            <a:off x="-17650" y="19378"/>
-            <a:ext cx="1519144" cy="1529725"/>
-          </a:xfrm>
-          <a:prstGeom prst="rect">
-            <a:avLst/>
-          </a:prstGeom>
-        </p:spPr>
-      </p:pic>
       <p:sp>
         <p:nvSpPr>
           <p:cNvPr id="23" name="AutoShape 1"/>
@@ -4229,6 +4198,30 @@
           </a:p>
         </p:txBody>
       </p:sp>
+      <p:pic>
+        <p:nvPicPr>
+          <p:cNvPr id="8" name="Picture 7"/>
+          <p:cNvPicPr>
+            <a:picLocks noChangeAspect="1"/>
+          </p:cNvPicPr>
+          <p:nvPr/>
+        </p:nvPicPr>
+        <p:blipFill>
+          <a:blip r:embed="rId2"/>
+          <a:stretch>
+            <a:fillRect/>
+          </a:stretch>
+        </p:blipFill>
+        <p:spPr>
+          <a:xfrm>
+            <a:off x="-26639" y="0"/>
+            <a:ext cx="1726017" cy="1656976"/>
+          </a:xfrm>
+          <a:prstGeom prst="rect">
+            <a:avLst/>
+          </a:prstGeom>
+        </p:spPr>
+      </p:pic>
     </p:spTree>
     <p:extLst>
       <p:ext uri="{BB962C8B-B14F-4D97-AF65-F5344CB8AC3E}">
@@ -4318,14 +4311,14 @@
           </a:ln>
           <a:extLst>
             <a:ext uri="{909E8E84-426E-40dd-AFC4-6F175D3DCCD1}">
-              <a14:hiddenFill xmlns="" xmlns:a14="http://schemas.microsoft.com/office/drawing/2010/main">
+              <a14:hiddenFill xmlns:a14="http://schemas.microsoft.com/office/drawing/2010/main">
                 <a:solidFill>
                   <a:srgbClr val="FFFFFF"/>
                 </a:solidFill>
               </a14:hiddenFill>
             </a:ext>
             <a:ext uri="{91240B29-F687-4f45-9708-019B960494DF}">
-              <a14:hiddenLine xmlns="" xmlns:a14="http://schemas.microsoft.com/office/drawing/2010/main" w="9525">
+              <a14:hiddenLine xmlns:a14="http://schemas.microsoft.com/office/drawing/2010/main" w="9525">
                 <a:solidFill>
                   <a:srgbClr val="000000"/>
                 </a:solidFill>
@@ -4402,7 +4395,7 @@
           <a:noFill/>
           <a:extLst>
             <a:ext uri="{909E8E84-426E-40dd-AFC4-6F175D3DCCD1}">
-              <a14:hiddenFill xmlns="" xmlns:a14="http://schemas.microsoft.com/office/drawing/2010/main">
+              <a14:hiddenFill xmlns:a14="http://schemas.microsoft.com/office/drawing/2010/main">
                 <a:solidFill>
                   <a:srgbClr val="FFFFFF"/>
                 </a:solidFill>
@@ -4516,7 +4509,7 @@
   <p:timing>
     <p:tnLst>
       <p:par>
-        <p:cTn id="1" dur="indefinite" restart="never" nodeType="tmRoot">
+        <p:cTn xmlns:p14="http://schemas.microsoft.com/office/powerpoint/2010/main" id="1" dur="indefinite" restart="never" nodeType="tmRoot">
           <p:childTnLst>
             <p:seq concurrent="1" nextAc="seek">
               <p:cTn id="2" dur="indefinite" nodeType="mainSeq">
@@ -4903,14 +4896,14 @@
           </a:ln>
           <a:extLst>
             <a:ext uri="{909E8E84-426E-40dd-AFC4-6F175D3DCCD1}">
-              <a14:hiddenFill xmlns="" xmlns:a14="http://schemas.microsoft.com/office/drawing/2010/main">
+              <a14:hiddenFill xmlns:a14="http://schemas.microsoft.com/office/drawing/2010/main">
                 <a:solidFill>
                   <a:srgbClr val="FFFFFF"/>
                 </a:solidFill>
               </a14:hiddenFill>
             </a:ext>
             <a:ext uri="{91240B29-F687-4f45-9708-019B960494DF}">
-              <a14:hiddenLine xmlns="" xmlns:a14="http://schemas.microsoft.com/office/drawing/2010/main" w="9525">
+              <a14:hiddenLine xmlns:a14="http://schemas.microsoft.com/office/drawing/2010/main" w="9525">
                 <a:solidFill>
                   <a:srgbClr val="000000"/>
                 </a:solidFill>
@@ -4944,14 +4937,14 @@
           </a:ln>
           <a:extLst>
             <a:ext uri="{909E8E84-426E-40dd-AFC4-6F175D3DCCD1}">
-              <a14:hiddenFill xmlns="" xmlns:a14="http://schemas.microsoft.com/office/drawing/2010/main">
+              <a14:hiddenFill xmlns:a14="http://schemas.microsoft.com/office/drawing/2010/main">
                 <a:solidFill>
                   <a:srgbClr val="FFFFFF"/>
                 </a:solidFill>
               </a14:hiddenFill>
             </a:ext>
             <a:ext uri="{91240B29-F687-4f45-9708-019B960494DF}">
-              <a14:hiddenLine xmlns="" xmlns:a14="http://schemas.microsoft.com/office/drawing/2010/main" w="9525">
+              <a14:hiddenLine xmlns:a14="http://schemas.microsoft.com/office/drawing/2010/main" w="9525">
                 <a:solidFill>
                   <a:srgbClr val="000000"/>
                 </a:solidFill>

</xml_diff>